<commit_message>
added code and figures to the pdf
</commit_message>
<xml_diff>
--- a/RA-L Hetro Sensors/pictures/shotgather_auto_drop.pptx
+++ b/RA-L Hetro Sensors/pictures/shotgather_auto_drop.pptx
@@ -106,7 +106,18 @@
   </p:defaultTextStyle>
   <p:extLst>
     <p:ext uri="{EFAFB233-063F-42B5-8137-9DF3F51BA10A}">
-      <p15:sldGuideLst xmlns:p15="http://schemas.microsoft.com/office/powerpoint/2012/main" xmlns=""/>
+      <p15:sldGuideLst xmlns:p15="http://schemas.microsoft.com/office/powerpoint/2012/main">
+        <p15:guide id="1" orient="horz" pos="3110">
+          <p15:clr>
+            <a:srgbClr val="A4A3A4"/>
+          </p15:clr>
+        </p15:guide>
+        <p15:guide id="2" pos="1987">
+          <p15:clr>
+            <a:srgbClr val="A4A3A4"/>
+          </p15:clr>
+        </p15:guide>
+      </p15:sldGuideLst>
     </p:ext>
   </p:extLst>
 </p:presentation>
@@ -243,7 +254,7 @@
           <a:p>
             <a:fld id="{B40AC1E3-6098-4FC5-AB3B-96AF947B43B2}" type="datetimeFigureOut">
               <a:rPr lang="en-US" smtClean="0"/>
-              <a:t>9/10/16</a:t>
+              <a:t>12/5/2016</a:t>
             </a:fld>
             <a:endParaRPr lang="en-US"/>
           </a:p>
@@ -413,7 +424,7 @@
           <a:p>
             <a:fld id="{B40AC1E3-6098-4FC5-AB3B-96AF947B43B2}" type="datetimeFigureOut">
               <a:rPr lang="en-US" smtClean="0"/>
-              <a:t>9/10/16</a:t>
+              <a:t>12/5/2016</a:t>
             </a:fld>
             <a:endParaRPr lang="en-US"/>
           </a:p>
@@ -593,7 +604,7 @@
           <a:p>
             <a:fld id="{B40AC1E3-6098-4FC5-AB3B-96AF947B43B2}" type="datetimeFigureOut">
               <a:rPr lang="en-US" smtClean="0"/>
-              <a:t>9/10/16</a:t>
+              <a:t>12/5/2016</a:t>
             </a:fld>
             <a:endParaRPr lang="en-US"/>
           </a:p>
@@ -763,7 +774,7 @@
           <a:p>
             <a:fld id="{B40AC1E3-6098-4FC5-AB3B-96AF947B43B2}" type="datetimeFigureOut">
               <a:rPr lang="en-US" smtClean="0"/>
-              <a:t>9/10/16</a:t>
+              <a:t>12/5/2016</a:t>
             </a:fld>
             <a:endParaRPr lang="en-US"/>
           </a:p>
@@ -1007,7 +1018,7 @@
           <a:p>
             <a:fld id="{B40AC1E3-6098-4FC5-AB3B-96AF947B43B2}" type="datetimeFigureOut">
               <a:rPr lang="en-US" smtClean="0"/>
-              <a:t>9/10/16</a:t>
+              <a:t>12/5/2016</a:t>
             </a:fld>
             <a:endParaRPr lang="en-US"/>
           </a:p>
@@ -1239,7 +1250,7 @@
           <a:p>
             <a:fld id="{B40AC1E3-6098-4FC5-AB3B-96AF947B43B2}" type="datetimeFigureOut">
               <a:rPr lang="en-US" smtClean="0"/>
-              <a:t>9/10/16</a:t>
+              <a:t>12/5/2016</a:t>
             </a:fld>
             <a:endParaRPr lang="en-US"/>
           </a:p>
@@ -1606,7 +1617,7 @@
           <a:p>
             <a:fld id="{B40AC1E3-6098-4FC5-AB3B-96AF947B43B2}" type="datetimeFigureOut">
               <a:rPr lang="en-US" smtClean="0"/>
-              <a:t>9/10/16</a:t>
+              <a:t>12/5/2016</a:t>
             </a:fld>
             <a:endParaRPr lang="en-US"/>
           </a:p>
@@ -1724,7 +1735,7 @@
           <a:p>
             <a:fld id="{B40AC1E3-6098-4FC5-AB3B-96AF947B43B2}" type="datetimeFigureOut">
               <a:rPr lang="en-US" smtClean="0"/>
-              <a:t>9/10/16</a:t>
+              <a:t>12/5/2016</a:t>
             </a:fld>
             <a:endParaRPr lang="en-US"/>
           </a:p>
@@ -1819,7 +1830,7 @@
           <a:p>
             <a:fld id="{B40AC1E3-6098-4FC5-AB3B-96AF947B43B2}" type="datetimeFigureOut">
               <a:rPr lang="en-US" smtClean="0"/>
-              <a:t>9/10/16</a:t>
+              <a:t>12/5/2016</a:t>
             </a:fld>
             <a:endParaRPr lang="en-US"/>
           </a:p>
@@ -2096,7 +2107,7 @@
           <a:p>
             <a:fld id="{B40AC1E3-6098-4FC5-AB3B-96AF947B43B2}" type="datetimeFigureOut">
               <a:rPr lang="en-US" smtClean="0"/>
-              <a:t>9/10/16</a:t>
+              <a:t>12/5/2016</a:t>
             </a:fld>
             <a:endParaRPr lang="en-US"/>
           </a:p>
@@ -2353,7 +2364,7 @@
           <a:p>
             <a:fld id="{B40AC1E3-6098-4FC5-AB3B-96AF947B43B2}" type="datetimeFigureOut">
               <a:rPr lang="en-US" smtClean="0"/>
-              <a:t>9/10/16</a:t>
+              <a:t>12/5/2016</a:t>
             </a:fld>
             <a:endParaRPr lang="en-US"/>
           </a:p>
@@ -2566,7 +2577,7 @@
           <a:p>
             <a:fld id="{B40AC1E3-6098-4FC5-AB3B-96AF947B43B2}" type="datetimeFigureOut">
               <a:rPr lang="en-US" smtClean="0"/>
-              <a:t>9/10/16</a:t>
+              <a:t>12/5/2016</a:t>
             </a:fld>
             <a:endParaRPr lang="en-US"/>
           </a:p>
@@ -2973,86 +2984,18 @@
       </p:grpSpPr>
       <p:grpSp>
         <p:nvGrpSpPr>
-          <p:cNvPr id="29" name="Group 28"/>
+          <p:cNvPr id="4" name="Group 3"/>
           <p:cNvGrpSpPr/>
           <p:nvPr/>
         </p:nvGrpSpPr>
         <p:grpSpPr>
           <a:xfrm>
-            <a:off x="311759" y="-76199"/>
-            <a:ext cx="7819942" cy="9925963"/>
-            <a:chOff x="0" y="570854"/>
-            <a:chExt cx="7819942" cy="9925963"/>
+            <a:off x="-43841" y="0"/>
+            <a:ext cx="6410036" cy="9849764"/>
+            <a:chOff x="-43841" y="0"/>
+            <a:chExt cx="6410036" cy="9849764"/>
           </a:xfrm>
         </p:grpSpPr>
-        <p:pic>
-          <p:nvPicPr>
-            <p:cNvPr id="32" name="Picture 31"/>
-            <p:cNvPicPr>
-              <a:picLocks noChangeAspect="1"/>
-            </p:cNvPicPr>
-            <p:nvPr/>
-          </p:nvPicPr>
-          <p:blipFill rotWithShape="1">
-            <a:blip r:embed="rId2" cstate="print">
-              <a:extLst>
-                <a:ext uri="{28A0092B-C50C-407E-A947-70E740481C1C}">
-                  <a14:useLocalDpi xmlns:a14="http://schemas.microsoft.com/office/drawing/2010/main" val="0"/>
-                </a:ext>
-              </a:extLst>
-            </a:blip>
-            <a:srcRect l="7417" t="7447" r="58323"/>
-            <a:stretch/>
-          </p:blipFill>
-          <p:spPr>
-            <a:xfrm rot="16200000">
-              <a:off x="901578" y="4711687"/>
-              <a:ext cx="4184197" cy="5627128"/>
-            </a:xfrm>
-            <a:prstGeom prst="rect">
-              <a:avLst/>
-            </a:prstGeom>
-            <a:ln w="12700">
-              <a:solidFill>
-                <a:schemeClr val="tx1"/>
-              </a:solidFill>
-            </a:ln>
-          </p:spPr>
-        </p:pic>
-        <p:pic>
-          <p:nvPicPr>
-            <p:cNvPr id="33" name="Picture 32"/>
-            <p:cNvPicPr>
-              <a:picLocks noChangeAspect="1"/>
-            </p:cNvPicPr>
-            <p:nvPr/>
-          </p:nvPicPr>
-          <p:blipFill rotWithShape="1">
-            <a:blip r:embed="rId2" cstate="print">
-              <a:extLst>
-                <a:ext uri="{28A0092B-C50C-407E-A947-70E740481C1C}">
-                  <a14:useLocalDpi xmlns:a14="http://schemas.microsoft.com/office/drawing/2010/main" val="0"/>
-                </a:ext>
-              </a:extLst>
-            </a:blip>
-            <a:srcRect l="60526" t="7580" r="6503"/>
-            <a:stretch/>
-          </p:blipFill>
-          <p:spPr>
-            <a:xfrm rot="16200000">
-              <a:off x="984336" y="192446"/>
-              <a:ext cx="4026694" cy="5619113"/>
-            </a:xfrm>
-            <a:prstGeom prst="rect">
-              <a:avLst/>
-            </a:prstGeom>
-            <a:ln w="12700">
-              <a:solidFill>
-                <a:schemeClr val="tx1"/>
-              </a:solidFill>
-            </a:ln>
-          </p:spPr>
-        </p:pic>
         <p:sp>
           <p:nvSpPr>
             <p:cNvPr id="34" name="TextBox 33"/>
@@ -3061,7 +3004,7 @@
           </p:nvSpPr>
           <p:spPr>
             <a:xfrm>
-              <a:off x="2375326" y="10035152"/>
+              <a:off x="2687085" y="9388099"/>
               <a:ext cx="1624266" cy="461665"/>
             </a:xfrm>
             <a:prstGeom prst="rect">
@@ -3098,8 +3041,8 @@
           </p:nvSpPr>
           <p:spPr>
             <a:xfrm>
-              <a:off x="1767548" y="570854"/>
-              <a:ext cx="3328171" cy="461665"/>
+              <a:off x="2010504" y="0"/>
+              <a:ext cx="2492693" cy="461665"/>
             </a:xfrm>
             <a:prstGeom prst="rect">
               <a:avLst/>
@@ -3128,8 +3071,8 @@
           </p:nvSpPr>
           <p:spPr>
             <a:xfrm>
-              <a:off x="118382" y="4971487"/>
-              <a:ext cx="7701560" cy="461665"/>
+              <a:off x="399685" y="4464039"/>
+              <a:ext cx="5878584" cy="461665"/>
             </a:xfrm>
             <a:prstGeom prst="rect">
               <a:avLst/>
@@ -3148,15 +3091,7 @@
               </a:r>
               <a:r>
                 <a:rPr lang="en-US" sz="2400" dirty="0" smtClean="0"/>
-                <a:t> </a:t>
-              </a:r>
-              <a:r>
-                <a:rPr lang="en-US" sz="2400" dirty="0" smtClean="0"/>
-                <a:t>Autonomous </a:t>
-              </a:r>
-              <a:r>
-                <a:rPr lang="en-US" sz="2400" dirty="0" smtClean="0"/>
-                <a:t>Deployment System</a:t>
+                <a:t> Autonomous Deployment System</a:t>
               </a:r>
               <a:endParaRPr lang="en-US" sz="2400" dirty="0"/>
             </a:p>
@@ -3170,7 +3105,7 @@
           </p:nvSpPr>
           <p:spPr>
             <a:xfrm>
-              <a:off x="0" y="9617350"/>
+              <a:off x="311759" y="8970297"/>
               <a:ext cx="6054436" cy="461665"/>
             </a:xfrm>
             <a:prstGeom prst="rect">
@@ -3192,91 +3127,149 @@
             </a:p>
           </p:txBody>
         </p:sp>
+        <p:sp>
+          <p:nvSpPr>
+            <p:cNvPr id="12" name="TextBox 11"/>
+            <p:cNvSpPr txBox="1"/>
+            <p:nvPr/>
+          </p:nvSpPr>
+          <p:spPr>
+            <a:xfrm rot="16200000">
+              <a:off x="-745281" y="2054447"/>
+              <a:ext cx="1889183" cy="461665"/>
+            </a:xfrm>
+            <a:prstGeom prst="rect">
+              <a:avLst/>
+            </a:prstGeom>
+            <a:noFill/>
+          </p:spPr>
+          <p:txBody>
+            <a:bodyPr wrap="square" rtlCol="0">
+              <a:spAutoFit/>
+            </a:bodyPr>
+            <a:lstStyle/>
+            <a:p>
+              <a:r>
+                <a:rPr lang="en-US" sz="2400" i="1" dirty="0" err="1" smtClean="0"/>
+                <a:t>V</a:t>
+              </a:r>
+              <a:r>
+                <a:rPr lang="en-US" sz="2400" baseline="-25000" dirty="0" err="1" smtClean="0"/>
+                <a:t>geophone</a:t>
+              </a:r>
+              <a:r>
+                <a:rPr lang="en-US" sz="2400" dirty="0" smtClean="0"/>
+                <a:t>  (V)</a:t>
+              </a:r>
+              <a:r>
+                <a:rPr lang="en-US" sz="2400" baseline="-25000" dirty="0" smtClean="0"/>
+                <a:t>  </a:t>
+              </a:r>
+              <a:endParaRPr lang="en-US" sz="2400" dirty="0"/>
+            </a:p>
+          </p:txBody>
+        </p:sp>
+        <p:sp>
+          <p:nvSpPr>
+            <p:cNvPr id="13" name="TextBox 12"/>
+            <p:cNvSpPr txBox="1"/>
+            <p:nvPr/>
+          </p:nvSpPr>
+          <p:spPr>
+            <a:xfrm rot="16200000">
+              <a:off x="-757600" y="6717168"/>
+              <a:ext cx="1889183" cy="461665"/>
+            </a:xfrm>
+            <a:prstGeom prst="rect">
+              <a:avLst/>
+            </a:prstGeom>
+            <a:noFill/>
+          </p:spPr>
+          <p:txBody>
+            <a:bodyPr wrap="square" rtlCol="0">
+              <a:spAutoFit/>
+            </a:bodyPr>
+            <a:lstStyle/>
+            <a:p>
+              <a:r>
+                <a:rPr lang="en-US" sz="2400" i="1" dirty="0" err="1" smtClean="0"/>
+                <a:t>V</a:t>
+              </a:r>
+              <a:r>
+                <a:rPr lang="en-US" sz="2400" baseline="-25000" dirty="0" err="1" smtClean="0"/>
+                <a:t>geophone</a:t>
+              </a:r>
+              <a:r>
+                <a:rPr lang="en-US" sz="2400" dirty="0" smtClean="0"/>
+                <a:t>  (V)</a:t>
+              </a:r>
+              <a:r>
+                <a:rPr lang="en-US" sz="2400" baseline="-25000" dirty="0" smtClean="0"/>
+                <a:t>  </a:t>
+              </a:r>
+              <a:endParaRPr lang="en-US" sz="2400" dirty="0"/>
+            </a:p>
+          </p:txBody>
+        </p:sp>
+        <p:pic>
+          <p:nvPicPr>
+            <p:cNvPr id="2" name="Picture 1"/>
+            <p:cNvPicPr>
+              <a:picLocks noChangeAspect="1"/>
+            </p:cNvPicPr>
+            <p:nvPr/>
+          </p:nvPicPr>
+          <p:blipFill rotWithShape="1">
+            <a:blip r:embed="rId2" cstate="print">
+              <a:extLst>
+                <a:ext uri="{28A0092B-C50C-407E-A947-70E740481C1C}">
+                  <a14:useLocalDpi xmlns:a14="http://schemas.microsoft.com/office/drawing/2010/main" val="0"/>
+                </a:ext>
+              </a:extLst>
+            </a:blip>
+            <a:srcRect l="10273" t="2595" r="58298"/>
+            <a:stretch/>
+          </p:blipFill>
+          <p:spPr>
+            <a:xfrm rot="16200000">
+              <a:off x="1345501" y="4063042"/>
+              <a:ext cx="3822700" cy="5653415"/>
+            </a:xfrm>
+            <a:prstGeom prst="rect">
+              <a:avLst/>
+            </a:prstGeom>
+          </p:spPr>
+        </p:pic>
+        <p:pic>
+          <p:nvPicPr>
+            <p:cNvPr id="14" name="Picture 13"/>
+            <p:cNvPicPr>
+              <a:picLocks noChangeAspect="1"/>
+            </p:cNvPicPr>
+            <p:nvPr/>
+          </p:nvPicPr>
+          <p:blipFill rotWithShape="1">
+            <a:blip r:embed="rId2" cstate="print">
+              <a:extLst>
+                <a:ext uri="{28A0092B-C50C-407E-A947-70E740481C1C}">
+                  <a14:useLocalDpi xmlns:a14="http://schemas.microsoft.com/office/drawing/2010/main" val="0"/>
+                </a:ext>
+              </a:extLst>
+            </a:blip>
+            <a:srcRect l="61711" t="2561" r="6958" b="985"/>
+            <a:stretch/>
+          </p:blipFill>
+          <p:spPr>
+            <a:xfrm rot="16200000">
+              <a:off x="1355158" y="-346643"/>
+              <a:ext cx="3809250" cy="5596234"/>
+            </a:xfrm>
+            <a:prstGeom prst="rect">
+              <a:avLst/>
+            </a:prstGeom>
+          </p:spPr>
+        </p:pic>
       </p:grpSp>
-      <p:sp>
-        <p:nvSpPr>
-          <p:cNvPr id="12" name="TextBox 11"/>
-          <p:cNvSpPr txBox="1"/>
-          <p:nvPr/>
-        </p:nvSpPr>
-        <p:spPr>
-          <a:xfrm rot="16200000">
-            <a:off x="-713759" y="1799410"/>
-            <a:ext cx="1889183" cy="461665"/>
-          </a:xfrm>
-          <a:prstGeom prst="rect">
-            <a:avLst/>
-          </a:prstGeom>
-          <a:noFill/>
-        </p:spPr>
-        <p:txBody>
-          <a:bodyPr wrap="square" rtlCol="0">
-            <a:spAutoFit/>
-          </a:bodyPr>
-          <a:lstStyle/>
-          <a:p>
-            <a:r>
-              <a:rPr lang="en-US" sz="2400" i="1" dirty="0" err="1" smtClean="0"/>
-              <a:t>V</a:t>
-            </a:r>
-            <a:r>
-              <a:rPr lang="en-US" sz="2400" baseline="-25000" dirty="0" err="1" smtClean="0"/>
-              <a:t>geophone</a:t>
-            </a:r>
-            <a:r>
-              <a:rPr lang="en-US" sz="2400" dirty="0" smtClean="0"/>
-              <a:t>  (V)</a:t>
-            </a:r>
-            <a:r>
-              <a:rPr lang="en-US" sz="2400" baseline="-25000" dirty="0" smtClean="0"/>
-              <a:t>  </a:t>
-            </a:r>
-            <a:endParaRPr lang="en-US" sz="2400" dirty="0"/>
-          </a:p>
-        </p:txBody>
-      </p:sp>
-      <p:sp>
-        <p:nvSpPr>
-          <p:cNvPr id="13" name="TextBox 12"/>
-          <p:cNvSpPr txBox="1"/>
-          <p:nvPr/>
-        </p:nvSpPr>
-        <p:spPr>
-          <a:xfrm rot="16200000">
-            <a:off x="-713759" y="6560705"/>
-            <a:ext cx="1889183" cy="461665"/>
-          </a:xfrm>
-          <a:prstGeom prst="rect">
-            <a:avLst/>
-          </a:prstGeom>
-          <a:noFill/>
-        </p:spPr>
-        <p:txBody>
-          <a:bodyPr wrap="square" rtlCol="0">
-            <a:spAutoFit/>
-          </a:bodyPr>
-          <a:lstStyle/>
-          <a:p>
-            <a:r>
-              <a:rPr lang="en-US" sz="2400" i="1" dirty="0" err="1" smtClean="0"/>
-              <a:t>V</a:t>
-            </a:r>
-            <a:r>
-              <a:rPr lang="en-US" sz="2400" baseline="-25000" dirty="0" err="1" smtClean="0"/>
-              <a:t>geophone</a:t>
-            </a:r>
-            <a:r>
-              <a:rPr lang="en-US" sz="2400" dirty="0" smtClean="0"/>
-              <a:t>  (V)</a:t>
-            </a:r>
-            <a:r>
-              <a:rPr lang="en-US" sz="2400" baseline="-25000" dirty="0" smtClean="0"/>
-              <a:t>  </a:t>
-            </a:r>
-            <a:endParaRPr lang="en-US" sz="2400" dirty="0"/>
-          </a:p>
-        </p:txBody>
-      </p:sp>
     </p:spTree>
     <p:extLst>
       <p:ext uri="{BB962C8B-B14F-4D97-AF65-F5344CB8AC3E}">
@@ -3545,7 +3538,7 @@
   <a:extraClrSchemeLst/>
   <a:extLst>
     <a:ext uri="{05A4C25C-085E-4340-85A3-A5531E510DB2}">
-      <thm15:themeFamily xmlns:thm15="http://schemas.microsoft.com/office/thememl/2012/main" xmlns="" name="Office Theme" id="{62F939B6-93AF-4DB8-9C6B-D6C7DFDC589F}" vid="{4A3C46E8-61CC-4603-A589-7422A47A8E4A}"/>
+      <thm15:themeFamily xmlns:thm15="http://schemas.microsoft.com/office/thememl/2012/main" name="Office Theme" id="{62F939B6-93AF-4DB8-9C6B-D6C7DFDC589F}" vid="{4A3C46E8-61CC-4603-A589-7422A47A8E4A}"/>
     </a:ext>
   </a:extLst>
 </a:theme>

</xml_diff>

<commit_message>
Revert "added code and figures to the pdf"
This reverts commit e62a73b20d3b4adf4a52c07058ef8fb02e29e0b9.
</commit_message>
<xml_diff>
--- a/RA-L Hetro Sensors/pictures/shotgather_auto_drop.pptx
+++ b/RA-L Hetro Sensors/pictures/shotgather_auto_drop.pptx
@@ -106,18 +106,7 @@
   </p:defaultTextStyle>
   <p:extLst>
     <p:ext uri="{EFAFB233-063F-42B5-8137-9DF3F51BA10A}">
-      <p15:sldGuideLst xmlns:p15="http://schemas.microsoft.com/office/powerpoint/2012/main">
-        <p15:guide id="1" orient="horz" pos="3110">
-          <p15:clr>
-            <a:srgbClr val="A4A3A4"/>
-          </p15:clr>
-        </p15:guide>
-        <p15:guide id="2" pos="1987">
-          <p15:clr>
-            <a:srgbClr val="A4A3A4"/>
-          </p15:clr>
-        </p15:guide>
-      </p15:sldGuideLst>
+      <p15:sldGuideLst xmlns:p15="http://schemas.microsoft.com/office/powerpoint/2012/main" xmlns=""/>
     </p:ext>
   </p:extLst>
 </p:presentation>
@@ -254,7 +243,7 @@
           <a:p>
             <a:fld id="{B40AC1E3-6098-4FC5-AB3B-96AF947B43B2}" type="datetimeFigureOut">
               <a:rPr lang="en-US" smtClean="0"/>
-              <a:t>12/5/2016</a:t>
+              <a:t>9/10/16</a:t>
             </a:fld>
             <a:endParaRPr lang="en-US"/>
           </a:p>
@@ -424,7 +413,7 @@
           <a:p>
             <a:fld id="{B40AC1E3-6098-4FC5-AB3B-96AF947B43B2}" type="datetimeFigureOut">
               <a:rPr lang="en-US" smtClean="0"/>
-              <a:t>12/5/2016</a:t>
+              <a:t>9/10/16</a:t>
             </a:fld>
             <a:endParaRPr lang="en-US"/>
           </a:p>
@@ -604,7 +593,7 @@
           <a:p>
             <a:fld id="{B40AC1E3-6098-4FC5-AB3B-96AF947B43B2}" type="datetimeFigureOut">
               <a:rPr lang="en-US" smtClean="0"/>
-              <a:t>12/5/2016</a:t>
+              <a:t>9/10/16</a:t>
             </a:fld>
             <a:endParaRPr lang="en-US"/>
           </a:p>
@@ -774,7 +763,7 @@
           <a:p>
             <a:fld id="{B40AC1E3-6098-4FC5-AB3B-96AF947B43B2}" type="datetimeFigureOut">
               <a:rPr lang="en-US" smtClean="0"/>
-              <a:t>12/5/2016</a:t>
+              <a:t>9/10/16</a:t>
             </a:fld>
             <a:endParaRPr lang="en-US"/>
           </a:p>
@@ -1018,7 +1007,7 @@
           <a:p>
             <a:fld id="{B40AC1E3-6098-4FC5-AB3B-96AF947B43B2}" type="datetimeFigureOut">
               <a:rPr lang="en-US" smtClean="0"/>
-              <a:t>12/5/2016</a:t>
+              <a:t>9/10/16</a:t>
             </a:fld>
             <a:endParaRPr lang="en-US"/>
           </a:p>
@@ -1250,7 +1239,7 @@
           <a:p>
             <a:fld id="{B40AC1E3-6098-4FC5-AB3B-96AF947B43B2}" type="datetimeFigureOut">
               <a:rPr lang="en-US" smtClean="0"/>
-              <a:t>12/5/2016</a:t>
+              <a:t>9/10/16</a:t>
             </a:fld>
             <a:endParaRPr lang="en-US"/>
           </a:p>
@@ -1617,7 +1606,7 @@
           <a:p>
             <a:fld id="{B40AC1E3-6098-4FC5-AB3B-96AF947B43B2}" type="datetimeFigureOut">
               <a:rPr lang="en-US" smtClean="0"/>
-              <a:t>12/5/2016</a:t>
+              <a:t>9/10/16</a:t>
             </a:fld>
             <a:endParaRPr lang="en-US"/>
           </a:p>
@@ -1735,7 +1724,7 @@
           <a:p>
             <a:fld id="{B40AC1E3-6098-4FC5-AB3B-96AF947B43B2}" type="datetimeFigureOut">
               <a:rPr lang="en-US" smtClean="0"/>
-              <a:t>12/5/2016</a:t>
+              <a:t>9/10/16</a:t>
             </a:fld>
             <a:endParaRPr lang="en-US"/>
           </a:p>
@@ -1830,7 +1819,7 @@
           <a:p>
             <a:fld id="{B40AC1E3-6098-4FC5-AB3B-96AF947B43B2}" type="datetimeFigureOut">
               <a:rPr lang="en-US" smtClean="0"/>
-              <a:t>12/5/2016</a:t>
+              <a:t>9/10/16</a:t>
             </a:fld>
             <a:endParaRPr lang="en-US"/>
           </a:p>
@@ -2107,7 +2096,7 @@
           <a:p>
             <a:fld id="{B40AC1E3-6098-4FC5-AB3B-96AF947B43B2}" type="datetimeFigureOut">
               <a:rPr lang="en-US" smtClean="0"/>
-              <a:t>12/5/2016</a:t>
+              <a:t>9/10/16</a:t>
             </a:fld>
             <a:endParaRPr lang="en-US"/>
           </a:p>
@@ -2364,7 +2353,7 @@
           <a:p>
             <a:fld id="{B40AC1E3-6098-4FC5-AB3B-96AF947B43B2}" type="datetimeFigureOut">
               <a:rPr lang="en-US" smtClean="0"/>
-              <a:t>12/5/2016</a:t>
+              <a:t>9/10/16</a:t>
             </a:fld>
             <a:endParaRPr lang="en-US"/>
           </a:p>
@@ -2577,7 +2566,7 @@
           <a:p>
             <a:fld id="{B40AC1E3-6098-4FC5-AB3B-96AF947B43B2}" type="datetimeFigureOut">
               <a:rPr lang="en-US" smtClean="0"/>
-              <a:t>12/5/2016</a:t>
+              <a:t>9/10/16</a:t>
             </a:fld>
             <a:endParaRPr lang="en-US"/>
           </a:p>
@@ -2984,18 +2973,86 @@
       </p:grpSpPr>
       <p:grpSp>
         <p:nvGrpSpPr>
-          <p:cNvPr id="4" name="Group 3"/>
+          <p:cNvPr id="29" name="Group 28"/>
           <p:cNvGrpSpPr/>
           <p:nvPr/>
         </p:nvGrpSpPr>
         <p:grpSpPr>
           <a:xfrm>
-            <a:off x="-43841" y="0"/>
-            <a:ext cx="6410036" cy="9849764"/>
-            <a:chOff x="-43841" y="0"/>
-            <a:chExt cx="6410036" cy="9849764"/>
+            <a:off x="311759" y="-76199"/>
+            <a:ext cx="7819942" cy="9925963"/>
+            <a:chOff x="0" y="570854"/>
+            <a:chExt cx="7819942" cy="9925963"/>
           </a:xfrm>
         </p:grpSpPr>
+        <p:pic>
+          <p:nvPicPr>
+            <p:cNvPr id="32" name="Picture 31"/>
+            <p:cNvPicPr>
+              <a:picLocks noChangeAspect="1"/>
+            </p:cNvPicPr>
+            <p:nvPr/>
+          </p:nvPicPr>
+          <p:blipFill rotWithShape="1">
+            <a:blip r:embed="rId2" cstate="print">
+              <a:extLst>
+                <a:ext uri="{28A0092B-C50C-407E-A947-70E740481C1C}">
+                  <a14:useLocalDpi xmlns:a14="http://schemas.microsoft.com/office/drawing/2010/main" val="0"/>
+                </a:ext>
+              </a:extLst>
+            </a:blip>
+            <a:srcRect l="7417" t="7447" r="58323"/>
+            <a:stretch/>
+          </p:blipFill>
+          <p:spPr>
+            <a:xfrm rot="16200000">
+              <a:off x="901578" y="4711687"/>
+              <a:ext cx="4184197" cy="5627128"/>
+            </a:xfrm>
+            <a:prstGeom prst="rect">
+              <a:avLst/>
+            </a:prstGeom>
+            <a:ln w="12700">
+              <a:solidFill>
+                <a:schemeClr val="tx1"/>
+              </a:solidFill>
+            </a:ln>
+          </p:spPr>
+        </p:pic>
+        <p:pic>
+          <p:nvPicPr>
+            <p:cNvPr id="33" name="Picture 32"/>
+            <p:cNvPicPr>
+              <a:picLocks noChangeAspect="1"/>
+            </p:cNvPicPr>
+            <p:nvPr/>
+          </p:nvPicPr>
+          <p:blipFill rotWithShape="1">
+            <a:blip r:embed="rId2" cstate="print">
+              <a:extLst>
+                <a:ext uri="{28A0092B-C50C-407E-A947-70E740481C1C}">
+                  <a14:useLocalDpi xmlns:a14="http://schemas.microsoft.com/office/drawing/2010/main" val="0"/>
+                </a:ext>
+              </a:extLst>
+            </a:blip>
+            <a:srcRect l="60526" t="7580" r="6503"/>
+            <a:stretch/>
+          </p:blipFill>
+          <p:spPr>
+            <a:xfrm rot="16200000">
+              <a:off x="984336" y="192446"/>
+              <a:ext cx="4026694" cy="5619113"/>
+            </a:xfrm>
+            <a:prstGeom prst="rect">
+              <a:avLst/>
+            </a:prstGeom>
+            <a:ln w="12700">
+              <a:solidFill>
+                <a:schemeClr val="tx1"/>
+              </a:solidFill>
+            </a:ln>
+          </p:spPr>
+        </p:pic>
         <p:sp>
           <p:nvSpPr>
             <p:cNvPr id="34" name="TextBox 33"/>
@@ -3004,7 +3061,7 @@
           </p:nvSpPr>
           <p:spPr>
             <a:xfrm>
-              <a:off x="2687085" y="9388099"/>
+              <a:off x="2375326" y="10035152"/>
               <a:ext cx="1624266" cy="461665"/>
             </a:xfrm>
             <a:prstGeom prst="rect">
@@ -3041,8 +3098,8 @@
           </p:nvSpPr>
           <p:spPr>
             <a:xfrm>
-              <a:off x="2010504" y="0"/>
-              <a:ext cx="2492693" cy="461665"/>
+              <a:off x="1767548" y="570854"/>
+              <a:ext cx="3328171" cy="461665"/>
             </a:xfrm>
             <a:prstGeom prst="rect">
               <a:avLst/>
@@ -3071,8 +3128,8 @@
           </p:nvSpPr>
           <p:spPr>
             <a:xfrm>
-              <a:off x="399685" y="4464039"/>
-              <a:ext cx="5878584" cy="461665"/>
+              <a:off x="118382" y="4971487"/>
+              <a:ext cx="7701560" cy="461665"/>
             </a:xfrm>
             <a:prstGeom prst="rect">
               <a:avLst/>
@@ -3091,7 +3148,15 @@
               </a:r>
               <a:r>
                 <a:rPr lang="en-US" sz="2400" dirty="0" smtClean="0"/>
-                <a:t> Autonomous Deployment System</a:t>
+                <a:t> </a:t>
+              </a:r>
+              <a:r>
+                <a:rPr lang="en-US" sz="2400" dirty="0" smtClean="0"/>
+                <a:t>Autonomous </a:t>
+              </a:r>
+              <a:r>
+                <a:rPr lang="en-US" sz="2400" dirty="0" smtClean="0"/>
+                <a:t>Deployment System</a:t>
               </a:r>
               <a:endParaRPr lang="en-US" sz="2400" dirty="0"/>
             </a:p>
@@ -3105,7 +3170,7 @@
           </p:nvSpPr>
           <p:spPr>
             <a:xfrm>
-              <a:off x="311759" y="8970297"/>
+              <a:off x="0" y="9617350"/>
               <a:ext cx="6054436" cy="461665"/>
             </a:xfrm>
             <a:prstGeom prst="rect">
@@ -3127,149 +3192,91 @@
             </a:p>
           </p:txBody>
         </p:sp>
-        <p:sp>
-          <p:nvSpPr>
-            <p:cNvPr id="12" name="TextBox 11"/>
-            <p:cNvSpPr txBox="1"/>
-            <p:nvPr/>
-          </p:nvSpPr>
-          <p:spPr>
-            <a:xfrm rot="16200000">
-              <a:off x="-745281" y="2054447"/>
-              <a:ext cx="1889183" cy="461665"/>
-            </a:xfrm>
-            <a:prstGeom prst="rect">
-              <a:avLst/>
-            </a:prstGeom>
-            <a:noFill/>
-          </p:spPr>
-          <p:txBody>
-            <a:bodyPr wrap="square" rtlCol="0">
-              <a:spAutoFit/>
-            </a:bodyPr>
-            <a:lstStyle/>
-            <a:p>
-              <a:r>
-                <a:rPr lang="en-US" sz="2400" i="1" dirty="0" err="1" smtClean="0"/>
-                <a:t>V</a:t>
-              </a:r>
-              <a:r>
-                <a:rPr lang="en-US" sz="2400" baseline="-25000" dirty="0" err="1" smtClean="0"/>
-                <a:t>geophone</a:t>
-              </a:r>
-              <a:r>
-                <a:rPr lang="en-US" sz="2400" dirty="0" smtClean="0"/>
-                <a:t>  (V)</a:t>
-              </a:r>
-              <a:r>
-                <a:rPr lang="en-US" sz="2400" baseline="-25000" dirty="0" smtClean="0"/>
-                <a:t>  </a:t>
-              </a:r>
-              <a:endParaRPr lang="en-US" sz="2400" dirty="0"/>
-            </a:p>
-          </p:txBody>
-        </p:sp>
-        <p:sp>
-          <p:nvSpPr>
-            <p:cNvPr id="13" name="TextBox 12"/>
-            <p:cNvSpPr txBox="1"/>
-            <p:nvPr/>
-          </p:nvSpPr>
-          <p:spPr>
-            <a:xfrm rot="16200000">
-              <a:off x="-757600" y="6717168"/>
-              <a:ext cx="1889183" cy="461665"/>
-            </a:xfrm>
-            <a:prstGeom prst="rect">
-              <a:avLst/>
-            </a:prstGeom>
-            <a:noFill/>
-          </p:spPr>
-          <p:txBody>
-            <a:bodyPr wrap="square" rtlCol="0">
-              <a:spAutoFit/>
-            </a:bodyPr>
-            <a:lstStyle/>
-            <a:p>
-              <a:r>
-                <a:rPr lang="en-US" sz="2400" i="1" dirty="0" err="1" smtClean="0"/>
-                <a:t>V</a:t>
-              </a:r>
-              <a:r>
-                <a:rPr lang="en-US" sz="2400" baseline="-25000" dirty="0" err="1" smtClean="0"/>
-                <a:t>geophone</a:t>
-              </a:r>
-              <a:r>
-                <a:rPr lang="en-US" sz="2400" dirty="0" smtClean="0"/>
-                <a:t>  (V)</a:t>
-              </a:r>
-              <a:r>
-                <a:rPr lang="en-US" sz="2400" baseline="-25000" dirty="0" smtClean="0"/>
-                <a:t>  </a:t>
-              </a:r>
-              <a:endParaRPr lang="en-US" sz="2400" dirty="0"/>
-            </a:p>
-          </p:txBody>
-        </p:sp>
-        <p:pic>
-          <p:nvPicPr>
-            <p:cNvPr id="2" name="Picture 1"/>
-            <p:cNvPicPr>
-              <a:picLocks noChangeAspect="1"/>
-            </p:cNvPicPr>
-            <p:nvPr/>
-          </p:nvPicPr>
-          <p:blipFill rotWithShape="1">
-            <a:blip r:embed="rId2" cstate="print">
-              <a:extLst>
-                <a:ext uri="{28A0092B-C50C-407E-A947-70E740481C1C}">
-                  <a14:useLocalDpi xmlns:a14="http://schemas.microsoft.com/office/drawing/2010/main" val="0"/>
-                </a:ext>
-              </a:extLst>
-            </a:blip>
-            <a:srcRect l="10273" t="2595" r="58298"/>
-            <a:stretch/>
-          </p:blipFill>
-          <p:spPr>
-            <a:xfrm rot="16200000">
-              <a:off x="1345501" y="4063042"/>
-              <a:ext cx="3822700" cy="5653415"/>
-            </a:xfrm>
-            <a:prstGeom prst="rect">
-              <a:avLst/>
-            </a:prstGeom>
-          </p:spPr>
-        </p:pic>
-        <p:pic>
-          <p:nvPicPr>
-            <p:cNvPr id="14" name="Picture 13"/>
-            <p:cNvPicPr>
-              <a:picLocks noChangeAspect="1"/>
-            </p:cNvPicPr>
-            <p:nvPr/>
-          </p:nvPicPr>
-          <p:blipFill rotWithShape="1">
-            <a:blip r:embed="rId2" cstate="print">
-              <a:extLst>
-                <a:ext uri="{28A0092B-C50C-407E-A947-70E740481C1C}">
-                  <a14:useLocalDpi xmlns:a14="http://schemas.microsoft.com/office/drawing/2010/main" val="0"/>
-                </a:ext>
-              </a:extLst>
-            </a:blip>
-            <a:srcRect l="61711" t="2561" r="6958" b="985"/>
-            <a:stretch/>
-          </p:blipFill>
-          <p:spPr>
-            <a:xfrm rot="16200000">
-              <a:off x="1355158" y="-346643"/>
-              <a:ext cx="3809250" cy="5596234"/>
-            </a:xfrm>
-            <a:prstGeom prst="rect">
-              <a:avLst/>
-            </a:prstGeom>
-          </p:spPr>
-        </p:pic>
       </p:grpSp>
+      <p:sp>
+        <p:nvSpPr>
+          <p:cNvPr id="12" name="TextBox 11"/>
+          <p:cNvSpPr txBox="1"/>
+          <p:nvPr/>
+        </p:nvSpPr>
+        <p:spPr>
+          <a:xfrm rot="16200000">
+            <a:off x="-713759" y="1799410"/>
+            <a:ext cx="1889183" cy="461665"/>
+          </a:xfrm>
+          <a:prstGeom prst="rect">
+            <a:avLst/>
+          </a:prstGeom>
+          <a:noFill/>
+        </p:spPr>
+        <p:txBody>
+          <a:bodyPr wrap="square" rtlCol="0">
+            <a:spAutoFit/>
+          </a:bodyPr>
+          <a:lstStyle/>
+          <a:p>
+            <a:r>
+              <a:rPr lang="en-US" sz="2400" i="1" dirty="0" err="1" smtClean="0"/>
+              <a:t>V</a:t>
+            </a:r>
+            <a:r>
+              <a:rPr lang="en-US" sz="2400" baseline="-25000" dirty="0" err="1" smtClean="0"/>
+              <a:t>geophone</a:t>
+            </a:r>
+            <a:r>
+              <a:rPr lang="en-US" sz="2400" dirty="0" smtClean="0"/>
+              <a:t>  (V)</a:t>
+            </a:r>
+            <a:r>
+              <a:rPr lang="en-US" sz="2400" baseline="-25000" dirty="0" smtClean="0"/>
+              <a:t>  </a:t>
+            </a:r>
+            <a:endParaRPr lang="en-US" sz="2400" dirty="0"/>
+          </a:p>
+        </p:txBody>
+      </p:sp>
+      <p:sp>
+        <p:nvSpPr>
+          <p:cNvPr id="13" name="TextBox 12"/>
+          <p:cNvSpPr txBox="1"/>
+          <p:nvPr/>
+        </p:nvSpPr>
+        <p:spPr>
+          <a:xfrm rot="16200000">
+            <a:off x="-713759" y="6560705"/>
+            <a:ext cx="1889183" cy="461665"/>
+          </a:xfrm>
+          <a:prstGeom prst="rect">
+            <a:avLst/>
+          </a:prstGeom>
+          <a:noFill/>
+        </p:spPr>
+        <p:txBody>
+          <a:bodyPr wrap="square" rtlCol="0">
+            <a:spAutoFit/>
+          </a:bodyPr>
+          <a:lstStyle/>
+          <a:p>
+            <a:r>
+              <a:rPr lang="en-US" sz="2400" i="1" dirty="0" err="1" smtClean="0"/>
+              <a:t>V</a:t>
+            </a:r>
+            <a:r>
+              <a:rPr lang="en-US" sz="2400" baseline="-25000" dirty="0" err="1" smtClean="0"/>
+              <a:t>geophone</a:t>
+            </a:r>
+            <a:r>
+              <a:rPr lang="en-US" sz="2400" dirty="0" smtClean="0"/>
+              <a:t>  (V)</a:t>
+            </a:r>
+            <a:r>
+              <a:rPr lang="en-US" sz="2400" baseline="-25000" dirty="0" smtClean="0"/>
+              <a:t>  </a:t>
+            </a:r>
+            <a:endParaRPr lang="en-US" sz="2400" dirty="0"/>
+          </a:p>
+        </p:txBody>
+      </p:sp>
     </p:spTree>
     <p:extLst>
       <p:ext uri="{BB962C8B-B14F-4D97-AF65-F5344CB8AC3E}">
@@ -3538,7 +3545,7 @@
   <a:extraClrSchemeLst/>
   <a:extLst>
     <a:ext uri="{05A4C25C-085E-4340-85A3-A5531E510DB2}">
-      <thm15:themeFamily xmlns:thm15="http://schemas.microsoft.com/office/thememl/2012/main" name="Office Theme" id="{62F939B6-93AF-4DB8-9C6B-D6C7DFDC589F}" vid="{4A3C46E8-61CC-4603-A589-7422A47A8E4A}"/>
+      <thm15:themeFamily xmlns:thm15="http://schemas.microsoft.com/office/thememl/2012/main" xmlns="" name="Office Theme" id="{62F939B6-93AF-4DB8-9C6B-D6C7DFDC589F}" vid="{4A3C46E8-61CC-4603-A589-7422A47A8E4A}"/>
     </a:ext>
   </a:extLst>
 </a:theme>

</xml_diff>

<commit_message>
Revert "Revert "added code and figures to the pdf""
This reverts commit ca1f9a728a50b8e08b2efe9098fc92c480c1718d.
</commit_message>
<xml_diff>
--- a/RA-L Hetro Sensors/pictures/shotgather_auto_drop.pptx
+++ b/RA-L Hetro Sensors/pictures/shotgather_auto_drop.pptx
@@ -106,7 +106,18 @@
   </p:defaultTextStyle>
   <p:extLst>
     <p:ext uri="{EFAFB233-063F-42B5-8137-9DF3F51BA10A}">
-      <p15:sldGuideLst xmlns:p15="http://schemas.microsoft.com/office/powerpoint/2012/main" xmlns=""/>
+      <p15:sldGuideLst xmlns:p15="http://schemas.microsoft.com/office/powerpoint/2012/main">
+        <p15:guide id="1" orient="horz" pos="3110">
+          <p15:clr>
+            <a:srgbClr val="A4A3A4"/>
+          </p15:clr>
+        </p15:guide>
+        <p15:guide id="2" pos="1987">
+          <p15:clr>
+            <a:srgbClr val="A4A3A4"/>
+          </p15:clr>
+        </p15:guide>
+      </p15:sldGuideLst>
     </p:ext>
   </p:extLst>
 </p:presentation>
@@ -243,7 +254,7 @@
           <a:p>
             <a:fld id="{B40AC1E3-6098-4FC5-AB3B-96AF947B43B2}" type="datetimeFigureOut">
               <a:rPr lang="en-US" smtClean="0"/>
-              <a:t>9/10/16</a:t>
+              <a:t>12/5/2016</a:t>
             </a:fld>
             <a:endParaRPr lang="en-US"/>
           </a:p>
@@ -413,7 +424,7 @@
           <a:p>
             <a:fld id="{B40AC1E3-6098-4FC5-AB3B-96AF947B43B2}" type="datetimeFigureOut">
               <a:rPr lang="en-US" smtClean="0"/>
-              <a:t>9/10/16</a:t>
+              <a:t>12/5/2016</a:t>
             </a:fld>
             <a:endParaRPr lang="en-US"/>
           </a:p>
@@ -593,7 +604,7 @@
           <a:p>
             <a:fld id="{B40AC1E3-6098-4FC5-AB3B-96AF947B43B2}" type="datetimeFigureOut">
               <a:rPr lang="en-US" smtClean="0"/>
-              <a:t>9/10/16</a:t>
+              <a:t>12/5/2016</a:t>
             </a:fld>
             <a:endParaRPr lang="en-US"/>
           </a:p>
@@ -763,7 +774,7 @@
           <a:p>
             <a:fld id="{B40AC1E3-6098-4FC5-AB3B-96AF947B43B2}" type="datetimeFigureOut">
               <a:rPr lang="en-US" smtClean="0"/>
-              <a:t>9/10/16</a:t>
+              <a:t>12/5/2016</a:t>
             </a:fld>
             <a:endParaRPr lang="en-US"/>
           </a:p>
@@ -1007,7 +1018,7 @@
           <a:p>
             <a:fld id="{B40AC1E3-6098-4FC5-AB3B-96AF947B43B2}" type="datetimeFigureOut">
               <a:rPr lang="en-US" smtClean="0"/>
-              <a:t>9/10/16</a:t>
+              <a:t>12/5/2016</a:t>
             </a:fld>
             <a:endParaRPr lang="en-US"/>
           </a:p>
@@ -1239,7 +1250,7 @@
           <a:p>
             <a:fld id="{B40AC1E3-6098-4FC5-AB3B-96AF947B43B2}" type="datetimeFigureOut">
               <a:rPr lang="en-US" smtClean="0"/>
-              <a:t>9/10/16</a:t>
+              <a:t>12/5/2016</a:t>
             </a:fld>
             <a:endParaRPr lang="en-US"/>
           </a:p>
@@ -1606,7 +1617,7 @@
           <a:p>
             <a:fld id="{B40AC1E3-6098-4FC5-AB3B-96AF947B43B2}" type="datetimeFigureOut">
               <a:rPr lang="en-US" smtClean="0"/>
-              <a:t>9/10/16</a:t>
+              <a:t>12/5/2016</a:t>
             </a:fld>
             <a:endParaRPr lang="en-US"/>
           </a:p>
@@ -1724,7 +1735,7 @@
           <a:p>
             <a:fld id="{B40AC1E3-6098-4FC5-AB3B-96AF947B43B2}" type="datetimeFigureOut">
               <a:rPr lang="en-US" smtClean="0"/>
-              <a:t>9/10/16</a:t>
+              <a:t>12/5/2016</a:t>
             </a:fld>
             <a:endParaRPr lang="en-US"/>
           </a:p>
@@ -1819,7 +1830,7 @@
           <a:p>
             <a:fld id="{B40AC1E3-6098-4FC5-AB3B-96AF947B43B2}" type="datetimeFigureOut">
               <a:rPr lang="en-US" smtClean="0"/>
-              <a:t>9/10/16</a:t>
+              <a:t>12/5/2016</a:t>
             </a:fld>
             <a:endParaRPr lang="en-US"/>
           </a:p>
@@ -2096,7 +2107,7 @@
           <a:p>
             <a:fld id="{B40AC1E3-6098-4FC5-AB3B-96AF947B43B2}" type="datetimeFigureOut">
               <a:rPr lang="en-US" smtClean="0"/>
-              <a:t>9/10/16</a:t>
+              <a:t>12/5/2016</a:t>
             </a:fld>
             <a:endParaRPr lang="en-US"/>
           </a:p>
@@ -2353,7 +2364,7 @@
           <a:p>
             <a:fld id="{B40AC1E3-6098-4FC5-AB3B-96AF947B43B2}" type="datetimeFigureOut">
               <a:rPr lang="en-US" smtClean="0"/>
-              <a:t>9/10/16</a:t>
+              <a:t>12/5/2016</a:t>
             </a:fld>
             <a:endParaRPr lang="en-US"/>
           </a:p>
@@ -2566,7 +2577,7 @@
           <a:p>
             <a:fld id="{B40AC1E3-6098-4FC5-AB3B-96AF947B43B2}" type="datetimeFigureOut">
               <a:rPr lang="en-US" smtClean="0"/>
-              <a:t>9/10/16</a:t>
+              <a:t>12/5/2016</a:t>
             </a:fld>
             <a:endParaRPr lang="en-US"/>
           </a:p>
@@ -2973,86 +2984,18 @@
       </p:grpSpPr>
       <p:grpSp>
         <p:nvGrpSpPr>
-          <p:cNvPr id="29" name="Group 28"/>
+          <p:cNvPr id="4" name="Group 3"/>
           <p:cNvGrpSpPr/>
           <p:nvPr/>
         </p:nvGrpSpPr>
         <p:grpSpPr>
           <a:xfrm>
-            <a:off x="311759" y="-76199"/>
-            <a:ext cx="7819942" cy="9925963"/>
-            <a:chOff x="0" y="570854"/>
-            <a:chExt cx="7819942" cy="9925963"/>
+            <a:off x="-43841" y="0"/>
+            <a:ext cx="6410036" cy="9849764"/>
+            <a:chOff x="-43841" y="0"/>
+            <a:chExt cx="6410036" cy="9849764"/>
           </a:xfrm>
         </p:grpSpPr>
-        <p:pic>
-          <p:nvPicPr>
-            <p:cNvPr id="32" name="Picture 31"/>
-            <p:cNvPicPr>
-              <a:picLocks noChangeAspect="1"/>
-            </p:cNvPicPr>
-            <p:nvPr/>
-          </p:nvPicPr>
-          <p:blipFill rotWithShape="1">
-            <a:blip r:embed="rId2" cstate="print">
-              <a:extLst>
-                <a:ext uri="{28A0092B-C50C-407E-A947-70E740481C1C}">
-                  <a14:useLocalDpi xmlns:a14="http://schemas.microsoft.com/office/drawing/2010/main" val="0"/>
-                </a:ext>
-              </a:extLst>
-            </a:blip>
-            <a:srcRect l="7417" t="7447" r="58323"/>
-            <a:stretch/>
-          </p:blipFill>
-          <p:spPr>
-            <a:xfrm rot="16200000">
-              <a:off x="901578" y="4711687"/>
-              <a:ext cx="4184197" cy="5627128"/>
-            </a:xfrm>
-            <a:prstGeom prst="rect">
-              <a:avLst/>
-            </a:prstGeom>
-            <a:ln w="12700">
-              <a:solidFill>
-                <a:schemeClr val="tx1"/>
-              </a:solidFill>
-            </a:ln>
-          </p:spPr>
-        </p:pic>
-        <p:pic>
-          <p:nvPicPr>
-            <p:cNvPr id="33" name="Picture 32"/>
-            <p:cNvPicPr>
-              <a:picLocks noChangeAspect="1"/>
-            </p:cNvPicPr>
-            <p:nvPr/>
-          </p:nvPicPr>
-          <p:blipFill rotWithShape="1">
-            <a:blip r:embed="rId2" cstate="print">
-              <a:extLst>
-                <a:ext uri="{28A0092B-C50C-407E-A947-70E740481C1C}">
-                  <a14:useLocalDpi xmlns:a14="http://schemas.microsoft.com/office/drawing/2010/main" val="0"/>
-                </a:ext>
-              </a:extLst>
-            </a:blip>
-            <a:srcRect l="60526" t="7580" r="6503"/>
-            <a:stretch/>
-          </p:blipFill>
-          <p:spPr>
-            <a:xfrm rot="16200000">
-              <a:off x="984336" y="192446"/>
-              <a:ext cx="4026694" cy="5619113"/>
-            </a:xfrm>
-            <a:prstGeom prst="rect">
-              <a:avLst/>
-            </a:prstGeom>
-            <a:ln w="12700">
-              <a:solidFill>
-                <a:schemeClr val="tx1"/>
-              </a:solidFill>
-            </a:ln>
-          </p:spPr>
-        </p:pic>
         <p:sp>
           <p:nvSpPr>
             <p:cNvPr id="34" name="TextBox 33"/>
@@ -3061,7 +3004,7 @@
           </p:nvSpPr>
           <p:spPr>
             <a:xfrm>
-              <a:off x="2375326" y="10035152"/>
+              <a:off x="2687085" y="9388099"/>
               <a:ext cx="1624266" cy="461665"/>
             </a:xfrm>
             <a:prstGeom prst="rect">
@@ -3098,8 +3041,8 @@
           </p:nvSpPr>
           <p:spPr>
             <a:xfrm>
-              <a:off x="1767548" y="570854"/>
-              <a:ext cx="3328171" cy="461665"/>
+              <a:off x="2010504" y="0"/>
+              <a:ext cx="2492693" cy="461665"/>
             </a:xfrm>
             <a:prstGeom prst="rect">
               <a:avLst/>
@@ -3128,8 +3071,8 @@
           </p:nvSpPr>
           <p:spPr>
             <a:xfrm>
-              <a:off x="118382" y="4971487"/>
-              <a:ext cx="7701560" cy="461665"/>
+              <a:off x="399685" y="4464039"/>
+              <a:ext cx="5878584" cy="461665"/>
             </a:xfrm>
             <a:prstGeom prst="rect">
               <a:avLst/>
@@ -3148,15 +3091,7 @@
               </a:r>
               <a:r>
                 <a:rPr lang="en-US" sz="2400" dirty="0" smtClean="0"/>
-                <a:t> </a:t>
-              </a:r>
-              <a:r>
-                <a:rPr lang="en-US" sz="2400" dirty="0" smtClean="0"/>
-                <a:t>Autonomous </a:t>
-              </a:r>
-              <a:r>
-                <a:rPr lang="en-US" sz="2400" dirty="0" smtClean="0"/>
-                <a:t>Deployment System</a:t>
+                <a:t> Autonomous Deployment System</a:t>
               </a:r>
               <a:endParaRPr lang="en-US" sz="2400" dirty="0"/>
             </a:p>
@@ -3170,7 +3105,7 @@
           </p:nvSpPr>
           <p:spPr>
             <a:xfrm>
-              <a:off x="0" y="9617350"/>
+              <a:off x="311759" y="8970297"/>
               <a:ext cx="6054436" cy="461665"/>
             </a:xfrm>
             <a:prstGeom prst="rect">
@@ -3192,91 +3127,149 @@
             </a:p>
           </p:txBody>
         </p:sp>
+        <p:sp>
+          <p:nvSpPr>
+            <p:cNvPr id="12" name="TextBox 11"/>
+            <p:cNvSpPr txBox="1"/>
+            <p:nvPr/>
+          </p:nvSpPr>
+          <p:spPr>
+            <a:xfrm rot="16200000">
+              <a:off x="-745281" y="2054447"/>
+              <a:ext cx="1889183" cy="461665"/>
+            </a:xfrm>
+            <a:prstGeom prst="rect">
+              <a:avLst/>
+            </a:prstGeom>
+            <a:noFill/>
+          </p:spPr>
+          <p:txBody>
+            <a:bodyPr wrap="square" rtlCol="0">
+              <a:spAutoFit/>
+            </a:bodyPr>
+            <a:lstStyle/>
+            <a:p>
+              <a:r>
+                <a:rPr lang="en-US" sz="2400" i="1" dirty="0" err="1" smtClean="0"/>
+                <a:t>V</a:t>
+              </a:r>
+              <a:r>
+                <a:rPr lang="en-US" sz="2400" baseline="-25000" dirty="0" err="1" smtClean="0"/>
+                <a:t>geophone</a:t>
+              </a:r>
+              <a:r>
+                <a:rPr lang="en-US" sz="2400" dirty="0" smtClean="0"/>
+                <a:t>  (V)</a:t>
+              </a:r>
+              <a:r>
+                <a:rPr lang="en-US" sz="2400" baseline="-25000" dirty="0" smtClean="0"/>
+                <a:t>  </a:t>
+              </a:r>
+              <a:endParaRPr lang="en-US" sz="2400" dirty="0"/>
+            </a:p>
+          </p:txBody>
+        </p:sp>
+        <p:sp>
+          <p:nvSpPr>
+            <p:cNvPr id="13" name="TextBox 12"/>
+            <p:cNvSpPr txBox="1"/>
+            <p:nvPr/>
+          </p:nvSpPr>
+          <p:spPr>
+            <a:xfrm rot="16200000">
+              <a:off x="-757600" y="6717168"/>
+              <a:ext cx="1889183" cy="461665"/>
+            </a:xfrm>
+            <a:prstGeom prst="rect">
+              <a:avLst/>
+            </a:prstGeom>
+            <a:noFill/>
+          </p:spPr>
+          <p:txBody>
+            <a:bodyPr wrap="square" rtlCol="0">
+              <a:spAutoFit/>
+            </a:bodyPr>
+            <a:lstStyle/>
+            <a:p>
+              <a:r>
+                <a:rPr lang="en-US" sz="2400" i="1" dirty="0" err="1" smtClean="0"/>
+                <a:t>V</a:t>
+              </a:r>
+              <a:r>
+                <a:rPr lang="en-US" sz="2400" baseline="-25000" dirty="0" err="1" smtClean="0"/>
+                <a:t>geophone</a:t>
+              </a:r>
+              <a:r>
+                <a:rPr lang="en-US" sz="2400" dirty="0" smtClean="0"/>
+                <a:t>  (V)</a:t>
+              </a:r>
+              <a:r>
+                <a:rPr lang="en-US" sz="2400" baseline="-25000" dirty="0" smtClean="0"/>
+                <a:t>  </a:t>
+              </a:r>
+              <a:endParaRPr lang="en-US" sz="2400" dirty="0"/>
+            </a:p>
+          </p:txBody>
+        </p:sp>
+        <p:pic>
+          <p:nvPicPr>
+            <p:cNvPr id="2" name="Picture 1"/>
+            <p:cNvPicPr>
+              <a:picLocks noChangeAspect="1"/>
+            </p:cNvPicPr>
+            <p:nvPr/>
+          </p:nvPicPr>
+          <p:blipFill rotWithShape="1">
+            <a:blip r:embed="rId2" cstate="print">
+              <a:extLst>
+                <a:ext uri="{28A0092B-C50C-407E-A947-70E740481C1C}">
+                  <a14:useLocalDpi xmlns:a14="http://schemas.microsoft.com/office/drawing/2010/main" val="0"/>
+                </a:ext>
+              </a:extLst>
+            </a:blip>
+            <a:srcRect l="10273" t="2595" r="58298"/>
+            <a:stretch/>
+          </p:blipFill>
+          <p:spPr>
+            <a:xfrm rot="16200000">
+              <a:off x="1345501" y="4063042"/>
+              <a:ext cx="3822700" cy="5653415"/>
+            </a:xfrm>
+            <a:prstGeom prst="rect">
+              <a:avLst/>
+            </a:prstGeom>
+          </p:spPr>
+        </p:pic>
+        <p:pic>
+          <p:nvPicPr>
+            <p:cNvPr id="14" name="Picture 13"/>
+            <p:cNvPicPr>
+              <a:picLocks noChangeAspect="1"/>
+            </p:cNvPicPr>
+            <p:nvPr/>
+          </p:nvPicPr>
+          <p:blipFill rotWithShape="1">
+            <a:blip r:embed="rId2" cstate="print">
+              <a:extLst>
+                <a:ext uri="{28A0092B-C50C-407E-A947-70E740481C1C}">
+                  <a14:useLocalDpi xmlns:a14="http://schemas.microsoft.com/office/drawing/2010/main" val="0"/>
+                </a:ext>
+              </a:extLst>
+            </a:blip>
+            <a:srcRect l="61711" t="2561" r="6958" b="985"/>
+            <a:stretch/>
+          </p:blipFill>
+          <p:spPr>
+            <a:xfrm rot="16200000">
+              <a:off x="1355158" y="-346643"/>
+              <a:ext cx="3809250" cy="5596234"/>
+            </a:xfrm>
+            <a:prstGeom prst="rect">
+              <a:avLst/>
+            </a:prstGeom>
+          </p:spPr>
+        </p:pic>
       </p:grpSp>
-      <p:sp>
-        <p:nvSpPr>
-          <p:cNvPr id="12" name="TextBox 11"/>
-          <p:cNvSpPr txBox="1"/>
-          <p:nvPr/>
-        </p:nvSpPr>
-        <p:spPr>
-          <a:xfrm rot="16200000">
-            <a:off x="-713759" y="1799410"/>
-            <a:ext cx="1889183" cy="461665"/>
-          </a:xfrm>
-          <a:prstGeom prst="rect">
-            <a:avLst/>
-          </a:prstGeom>
-          <a:noFill/>
-        </p:spPr>
-        <p:txBody>
-          <a:bodyPr wrap="square" rtlCol="0">
-            <a:spAutoFit/>
-          </a:bodyPr>
-          <a:lstStyle/>
-          <a:p>
-            <a:r>
-              <a:rPr lang="en-US" sz="2400" i="1" dirty="0" err="1" smtClean="0"/>
-              <a:t>V</a:t>
-            </a:r>
-            <a:r>
-              <a:rPr lang="en-US" sz="2400" baseline="-25000" dirty="0" err="1" smtClean="0"/>
-              <a:t>geophone</a:t>
-            </a:r>
-            <a:r>
-              <a:rPr lang="en-US" sz="2400" dirty="0" smtClean="0"/>
-              <a:t>  (V)</a:t>
-            </a:r>
-            <a:r>
-              <a:rPr lang="en-US" sz="2400" baseline="-25000" dirty="0" smtClean="0"/>
-              <a:t>  </a:t>
-            </a:r>
-            <a:endParaRPr lang="en-US" sz="2400" dirty="0"/>
-          </a:p>
-        </p:txBody>
-      </p:sp>
-      <p:sp>
-        <p:nvSpPr>
-          <p:cNvPr id="13" name="TextBox 12"/>
-          <p:cNvSpPr txBox="1"/>
-          <p:nvPr/>
-        </p:nvSpPr>
-        <p:spPr>
-          <a:xfrm rot="16200000">
-            <a:off x="-713759" y="6560705"/>
-            <a:ext cx="1889183" cy="461665"/>
-          </a:xfrm>
-          <a:prstGeom prst="rect">
-            <a:avLst/>
-          </a:prstGeom>
-          <a:noFill/>
-        </p:spPr>
-        <p:txBody>
-          <a:bodyPr wrap="square" rtlCol="0">
-            <a:spAutoFit/>
-          </a:bodyPr>
-          <a:lstStyle/>
-          <a:p>
-            <a:r>
-              <a:rPr lang="en-US" sz="2400" i="1" dirty="0" err="1" smtClean="0"/>
-              <a:t>V</a:t>
-            </a:r>
-            <a:r>
-              <a:rPr lang="en-US" sz="2400" baseline="-25000" dirty="0" err="1" smtClean="0"/>
-              <a:t>geophone</a:t>
-            </a:r>
-            <a:r>
-              <a:rPr lang="en-US" sz="2400" dirty="0" smtClean="0"/>
-              <a:t>  (V)</a:t>
-            </a:r>
-            <a:r>
-              <a:rPr lang="en-US" sz="2400" baseline="-25000" dirty="0" smtClean="0"/>
-              <a:t>  </a:t>
-            </a:r>
-            <a:endParaRPr lang="en-US" sz="2400" dirty="0"/>
-          </a:p>
-        </p:txBody>
-      </p:sp>
     </p:spTree>
     <p:extLst>
       <p:ext uri="{BB962C8B-B14F-4D97-AF65-F5344CB8AC3E}">
@@ -3545,7 +3538,7 @@
   <a:extraClrSchemeLst/>
   <a:extLst>
     <a:ext uri="{05A4C25C-085E-4340-85A3-A5531E510DB2}">
-      <thm15:themeFamily xmlns:thm15="http://schemas.microsoft.com/office/thememl/2012/main" xmlns="" name="Office Theme" id="{62F939B6-93AF-4DB8-9C6B-D6C7DFDC589F}" vid="{4A3C46E8-61CC-4603-A589-7422A47A8E4A}"/>
+      <thm15:themeFamily xmlns:thm15="http://schemas.microsoft.com/office/thememl/2012/main" name="Office Theme" id="{62F939B6-93AF-4DB8-9C6B-D6C7DFDC589F}" vid="{4A3C46E8-61CC-4603-A589-7422A47A8E4A}"/>
     </a:ext>
   </a:extLst>
 </a:theme>

</xml_diff>